<commit_message>
finishing the final presentation
</commit_message>
<xml_diff>
--- a/03_Final Presentation Template.pptx
+++ b/03_Final Presentation Template.pptx
@@ -287,7 +287,7 @@
 <file path=ppt/revisionInfo.xml><?xml version="1.0" encoding="utf-8"?>
 <p1510:revInfo xmlns:a="http://schemas.openxmlformats.org/drawingml/2006/main" xmlns:r="http://schemas.openxmlformats.org/officeDocument/2006/relationships" xmlns:p1510="http://schemas.microsoft.com/office/powerpoint/2015/10/main">
   <p1510:revLst>
-    <p1510:client id="{ABDD6F7D-79AF-4D42-A8B0-8BDC6E4DD92A}" v="28" dt="2020-02-18T20:57:18.572"/>
+    <p1510:client id="{ABDD6F7D-79AF-4D42-A8B0-8BDC6E4DD92A}" v="35" dt="2020-02-19T15:05:42.758"/>
   </p1510:revLst>
 </p1510:revInfo>
 </file>
@@ -297,7 +297,7 @@
   <pc:docChgLst>
     <pc:chgData name="Osama Mohammed Moustafa Hosam Elde" userId="ab8f451e-a635-42ee-be12-e2dde55852bf" providerId="ADAL" clId="{ABDD6F7D-79AF-4D42-A8B0-8BDC6E4DD92A}"/>
     <pc:docChg chg="custSel modSld">
-      <pc:chgData name="Osama Mohammed Moustafa Hosam Elde" userId="ab8f451e-a635-42ee-be12-e2dde55852bf" providerId="ADAL" clId="{ABDD6F7D-79AF-4D42-A8B0-8BDC6E4DD92A}" dt="2020-02-18T20:57:30.957" v="1144" actId="14100"/>
+      <pc:chgData name="Osama Mohammed Moustafa Hosam Elde" userId="ab8f451e-a635-42ee-be12-e2dde55852bf" providerId="ADAL" clId="{ABDD6F7D-79AF-4D42-A8B0-8BDC6E4DD92A}" dt="2020-02-19T15:07:48.026" v="1858" actId="20577"/>
       <pc:docMkLst>
         <pc:docMk/>
       </pc:docMkLst>
@@ -798,6 +798,92 @@
           </ac:picMkLst>
         </pc:picChg>
       </pc:sldChg>
+      <pc:sldChg chg="modSp">
+        <pc:chgData name="Osama Mohammed Moustafa Hosam Elde" userId="ab8f451e-a635-42ee-be12-e2dde55852bf" providerId="ADAL" clId="{ABDD6F7D-79AF-4D42-A8B0-8BDC6E4DD92A}" dt="2020-02-19T15:04:38.383" v="1661" actId="20577"/>
+        <pc:sldMkLst>
+          <pc:docMk/>
+          <pc:sldMk cId="0" sldId="263"/>
+        </pc:sldMkLst>
+        <pc:graphicFrameChg chg="mod modGraphic">
+          <ac:chgData name="Osama Mohammed Moustafa Hosam Elde" userId="ab8f451e-a635-42ee-be12-e2dde55852bf" providerId="ADAL" clId="{ABDD6F7D-79AF-4D42-A8B0-8BDC6E4DD92A}" dt="2020-02-19T15:04:38.383" v="1661" actId="20577"/>
+          <ac:graphicFrameMkLst>
+            <pc:docMk/>
+            <pc:sldMk cId="0" sldId="263"/>
+            <ac:graphicFrameMk id="142" creationId="{00000000-0000-0000-0000-000000000000}"/>
+          </ac:graphicFrameMkLst>
+        </pc:graphicFrameChg>
+      </pc:sldChg>
+      <pc:sldChg chg="addSp delSp modSp">
+        <pc:chgData name="Osama Mohammed Moustafa Hosam Elde" userId="ab8f451e-a635-42ee-be12-e2dde55852bf" providerId="ADAL" clId="{ABDD6F7D-79AF-4D42-A8B0-8BDC6E4DD92A}" dt="2020-02-19T15:07:48.026" v="1858" actId="20577"/>
+        <pc:sldMkLst>
+          <pc:docMk/>
+          <pc:sldMk cId="0" sldId="264"/>
+        </pc:sldMkLst>
+        <pc:spChg chg="mod">
+          <ac:chgData name="Osama Mohammed Moustafa Hosam Elde" userId="ab8f451e-a635-42ee-be12-e2dde55852bf" providerId="ADAL" clId="{ABDD6F7D-79AF-4D42-A8B0-8BDC6E4DD92A}" dt="2020-02-19T15:05:42.758" v="1667"/>
+          <ac:spMkLst>
+            <pc:docMk/>
+            <pc:sldMk cId="0" sldId="264"/>
+            <ac:spMk id="151" creationId="{00000000-0000-0000-0000-000000000000}"/>
+          </ac:spMkLst>
+        </pc:spChg>
+        <pc:spChg chg="del mod">
+          <ac:chgData name="Osama Mohammed Moustafa Hosam Elde" userId="ab8f451e-a635-42ee-be12-e2dde55852bf" providerId="ADAL" clId="{ABDD6F7D-79AF-4D42-A8B0-8BDC6E4DD92A}" dt="2020-02-19T15:05:48.491" v="1669" actId="478"/>
+          <ac:spMkLst>
+            <pc:docMk/>
+            <pc:sldMk cId="0" sldId="264"/>
+            <ac:spMk id="152" creationId="{00000000-0000-0000-0000-000000000000}"/>
+          </ac:spMkLst>
+        </pc:spChg>
+        <pc:spChg chg="mod">
+          <ac:chgData name="Osama Mohammed Moustafa Hosam Elde" userId="ab8f451e-a635-42ee-be12-e2dde55852bf" providerId="ADAL" clId="{ABDD6F7D-79AF-4D42-A8B0-8BDC6E4DD92A}" dt="2020-02-19T15:06:34.918" v="1766" actId="20577"/>
+          <ac:spMkLst>
+            <pc:docMk/>
+            <pc:sldMk cId="0" sldId="264"/>
+            <ac:spMk id="154" creationId="{00000000-0000-0000-0000-000000000000}"/>
+          </ac:spMkLst>
+        </pc:spChg>
+        <pc:spChg chg="mod">
+          <ac:chgData name="Osama Mohammed Moustafa Hosam Elde" userId="ab8f451e-a635-42ee-be12-e2dde55852bf" providerId="ADAL" clId="{ABDD6F7D-79AF-4D42-A8B0-8BDC6E4DD92A}" dt="2020-02-19T15:07:21.689" v="1817" actId="20577"/>
+          <ac:spMkLst>
+            <pc:docMk/>
+            <pc:sldMk cId="0" sldId="264"/>
+            <ac:spMk id="156" creationId="{00000000-0000-0000-0000-000000000000}"/>
+          </ac:spMkLst>
+        </pc:spChg>
+        <pc:spChg chg="mod">
+          <ac:chgData name="Osama Mohammed Moustafa Hosam Elde" userId="ab8f451e-a635-42ee-be12-e2dde55852bf" providerId="ADAL" clId="{ABDD6F7D-79AF-4D42-A8B0-8BDC6E4DD92A}" dt="2020-02-19T15:07:37.701" v="1832" actId="20577"/>
+          <ac:spMkLst>
+            <pc:docMk/>
+            <pc:sldMk cId="0" sldId="264"/>
+            <ac:spMk id="157" creationId="{00000000-0000-0000-0000-000000000000}"/>
+          </ac:spMkLst>
+        </pc:spChg>
+        <pc:spChg chg="mod">
+          <ac:chgData name="Osama Mohammed Moustafa Hosam Elde" userId="ab8f451e-a635-42ee-be12-e2dde55852bf" providerId="ADAL" clId="{ABDD6F7D-79AF-4D42-A8B0-8BDC6E4DD92A}" dt="2020-02-19T15:07:48.026" v="1858" actId="20577"/>
+          <ac:spMkLst>
+            <pc:docMk/>
+            <pc:sldMk cId="0" sldId="264"/>
+            <ac:spMk id="158" creationId="{00000000-0000-0000-0000-000000000000}"/>
+          </ac:spMkLst>
+        </pc:spChg>
+        <pc:picChg chg="add mod">
+          <ac:chgData name="Osama Mohammed Moustafa Hosam Elde" userId="ab8f451e-a635-42ee-be12-e2dde55852bf" providerId="ADAL" clId="{ABDD6F7D-79AF-4D42-A8B0-8BDC6E4DD92A}" dt="2020-02-19T15:05:27.590" v="1666" actId="14100"/>
+          <ac:picMkLst>
+            <pc:docMk/>
+            <pc:sldMk cId="0" sldId="264"/>
+            <ac:picMk id="14" creationId="{DC6ED223-EC4E-437A-A996-FE1BFC934090}"/>
+          </ac:picMkLst>
+        </pc:picChg>
+        <pc:picChg chg="del">
+          <ac:chgData name="Osama Mohammed Moustafa Hosam Elde" userId="ab8f451e-a635-42ee-be12-e2dde55852bf" providerId="ADAL" clId="{ABDD6F7D-79AF-4D42-A8B0-8BDC6E4DD92A}" dt="2020-02-19T15:05:14.671" v="1662" actId="478"/>
+          <ac:picMkLst>
+            <pc:docMk/>
+            <pc:sldMk cId="0" sldId="264"/>
+            <ac:picMk id="148" creationId="{00000000-0000-0000-0000-000000000000}"/>
+          </ac:picMkLst>
+        </pc:picChg>
+      </pc:sldChg>
     </pc:docChg>
   </pc:docChgLst>
 </pc:chgInfo>
@@ -2001,7 +2087,7 @@
         </p:nvSpPr>
         <p:spPr>
           <a:xfrm>
-            <a:off x="381300" y="685800"/>
+            <a:off x="381000" y="685800"/>
             <a:ext cx="6096000" cy="3429000"/>
           </a:xfrm>
           <a:custGeom>
@@ -2105,7 +2191,7 @@
         </p:nvSpPr>
         <p:spPr>
           <a:xfrm>
-            <a:off x="381300" y="685800"/>
+            <a:off x="381000" y="685800"/>
             <a:ext cx="6096000" cy="3429000"/>
           </a:xfrm>
           <a:custGeom>
@@ -11621,11 +11707,17 @@
         <p:nvGraphicFramePr>
           <p:cNvPr id="142" name="Google Shape;142;p20"/>
           <p:cNvGraphicFramePr/>
-          <p:nvPr/>
+          <p:nvPr>
+            <p:extLst>
+              <p:ext uri="{D42A27DB-BD31-4B8C-83A1-F6EECF244321}">
+                <p14:modId xmlns:p14="http://schemas.microsoft.com/office/powerpoint/2010/main" val="1667970590"/>
+              </p:ext>
+            </p:extLst>
+          </p:nvPr>
         </p:nvGraphicFramePr>
         <p:xfrm>
           <a:off x="484225" y="1446550"/>
-          <a:ext cx="8348100" cy="3522585"/>
+          <a:ext cx="8348100" cy="3735945"/>
         </p:xfrm>
         <a:graphic>
           <a:graphicData uri="http://schemas.openxmlformats.org/drawingml/2006/table">
@@ -11737,10 +11829,10 @@
                         <a:buNone/>
                       </a:pPr>
                       <a:r>
-                        <a:rPr lang="en" b="1"/>
-                        <a:t>Use Case</a:t>
+                        <a:rPr lang="en-US" b="1" dirty="0"/>
+                        <a:t>Quality Control with Computer Vision</a:t>
                       </a:r>
-                      <a:endParaRPr b="1"/>
+                      <a:endParaRPr b="1" dirty="0"/>
                     </a:p>
                   </a:txBody>
                   <a:tcPr marL="91425" marR="91425" marT="91425" marB="91425">
@@ -11805,10 +11897,10 @@
                         <a:buNone/>
                       </a:pPr>
                       <a:r>
-                        <a:rPr lang="en" b="1"/>
-                        <a:t>Use Case</a:t>
+                        <a:rPr lang="en-US" b="1" dirty="0"/>
+                        <a:t>Car maintenance Expectation</a:t>
                       </a:r>
-                      <a:endParaRPr b="1"/>
+                      <a:endParaRPr b="1" dirty="0"/>
                     </a:p>
                   </a:txBody>
                   <a:tcPr marL="91425" marR="91425" marT="91425" marB="91425">
@@ -11880,17 +11972,17 @@
                         <a:buNone/>
                       </a:pPr>
                       <a:r>
-                        <a:rPr lang="en" b="1"/>
+                        <a:rPr lang="en" b="1" dirty="0"/>
                         <a:t>Accuracy</a:t>
                       </a:r>
                       <a:br>
-                        <a:rPr lang="en" b="1"/>
+                        <a:rPr lang="en" b="1" dirty="0"/>
                       </a:br>
                       <a:r>
-                        <a:rPr lang="en" sz="1200" i="1"/>
+                        <a:rPr lang="en" sz="1200" i="1" dirty="0"/>
                         <a:t>Definition</a:t>
                       </a:r>
-                      <a:endParaRPr sz="1200" i="1"/>
+                      <a:endParaRPr sz="1200" i="1" dirty="0"/>
                     </a:p>
                   </a:txBody>
                   <a:tcPr marL="91425" marR="91425" marT="91425" marB="91425">
@@ -11955,10 +12047,14 @@
                         <a:buNone/>
                       </a:pPr>
                       <a:r>
-                        <a:rPr lang="en" sz="1200"/>
+                        <a:rPr lang="en" sz="1200" dirty="0"/>
                         <a:t>Concerns: </a:t>
                       </a:r>
-                      <a:endParaRPr sz="1200"/>
+                      <a:r>
+                        <a:rPr lang="en-US" sz="1200" dirty="0"/>
+                        <a:t>illumination, camera space</a:t>
+                      </a:r>
+                      <a:endParaRPr sz="1200" dirty="0"/>
                     </a:p>
                     <a:p>
                       <a:pPr marL="0" lvl="0" indent="0" algn="l" rtl="0">
@@ -11971,10 +12067,14 @@
                         <a:buNone/>
                       </a:pPr>
                       <a:r>
-                        <a:rPr lang="en" sz="1200"/>
-                        <a:t>Plan:</a:t>
+                        <a:rPr lang="en" sz="1200" dirty="0"/>
+                        <a:t>Plan: </a:t>
                       </a:r>
-                      <a:endParaRPr sz="1200"/>
+                      <a:r>
+                        <a:rPr lang="en-US" sz="1200" dirty="0"/>
+                        <a:t>put reasonable lights and get extra space for the camera. </a:t>
+                      </a:r>
+                      <a:endParaRPr sz="1200" dirty="0"/>
                     </a:p>
                   </a:txBody>
                   <a:tcPr marL="91425" marR="91425" marT="91425" marB="91425">
@@ -12039,10 +12139,18 @@
                         <a:buNone/>
                       </a:pPr>
                       <a:r>
-                        <a:rPr lang="en" sz="1200"/>
+                        <a:rPr lang="en" sz="1200" dirty="0"/>
                         <a:t>Concerns: </a:t>
                       </a:r>
-                      <a:endParaRPr sz="1200"/>
+                      <a:r>
+                        <a:rPr lang="en-US" sz="1200" dirty="0"/>
+                        <a:t>sensor hardware faults</a:t>
+                      </a:r>
+                      <a:r>
+                        <a:rPr lang="en" sz="1200" dirty="0"/>
+                        <a:t> </a:t>
+                      </a:r>
+                      <a:endParaRPr sz="1200" dirty="0"/>
                     </a:p>
                     <a:p>
                       <a:pPr marL="0" lvl="0" indent="0" algn="l" rtl="0">
@@ -12055,10 +12163,14 @@
                         <a:buNone/>
                       </a:pPr>
                       <a:r>
-                        <a:rPr lang="en" sz="1200"/>
-                        <a:t>Plan:</a:t>
+                        <a:rPr lang="en" sz="1200" dirty="0"/>
+                        <a:t>Plan: </a:t>
                       </a:r>
-                      <a:endParaRPr sz="1200"/>
+                      <a:r>
+                        <a:rPr lang="en-US" sz="1200" dirty="0"/>
+                        <a:t>make backup sensors and make sure that the sensors has direct effect on the overall decision</a:t>
+                      </a:r>
+                      <a:endParaRPr sz="1200" dirty="0"/>
                     </a:p>
                   </a:txBody>
                   <a:tcPr marL="91425" marR="91425" marT="91425" marB="91425">
@@ -12205,10 +12317,18 @@
                         <a:buNone/>
                       </a:pPr>
                       <a:r>
-                        <a:rPr lang="en" sz="1200"/>
+                        <a:rPr lang="en" sz="1200" dirty="0"/>
                         <a:t>Concerns: </a:t>
                       </a:r>
-                      <a:endParaRPr sz="1200"/>
+                      <a:r>
+                        <a:rPr lang="en-US" sz="1200" dirty="0"/>
+                        <a:t>overfitting</a:t>
+                      </a:r>
+                      <a:r>
+                        <a:rPr lang="en" sz="1200" dirty="0"/>
+                        <a:t> </a:t>
+                      </a:r>
+                      <a:endParaRPr sz="1200" dirty="0"/>
                     </a:p>
                     <a:p>
                       <a:pPr marL="0" lvl="0" indent="0" algn="l" rtl="0">
@@ -12221,10 +12341,14 @@
                         <a:buNone/>
                       </a:pPr>
                       <a:r>
-                        <a:rPr lang="en" sz="1200"/>
-                        <a:t>Plan:</a:t>
+                        <a:rPr lang="en" sz="1200" dirty="0"/>
+                        <a:t>Plan: </a:t>
                       </a:r>
-                      <a:endParaRPr sz="1200"/>
+                      <a:r>
+                        <a:rPr lang="en-US" sz="1200" dirty="0"/>
+                        <a:t>user different datasets for training and testing</a:t>
+                      </a:r>
+                      <a:endParaRPr sz="1200" dirty="0"/>
                     </a:p>
                     <a:p>
                       <a:pPr marL="0" lvl="0" indent="0" algn="l" rtl="0">
@@ -12236,7 +12360,7 @@
                         </a:spcAft>
                         <a:buNone/>
                       </a:pPr>
-                      <a:endParaRPr sz="1200"/>
+                      <a:endParaRPr sz="1200" dirty="0"/>
                     </a:p>
                   </a:txBody>
                   <a:tcPr marL="91425" marR="91425" marT="91425" marB="91425">
@@ -12301,10 +12425,14 @@
                         <a:buNone/>
                       </a:pPr>
                       <a:r>
-                        <a:rPr lang="en" sz="1200"/>
+                        <a:rPr lang="en" sz="1200" dirty="0"/>
                         <a:t>Concerns: </a:t>
                       </a:r>
-                      <a:endParaRPr sz="1200"/>
+                      <a:r>
+                        <a:rPr lang="en-US" sz="1200" dirty="0"/>
+                        <a:t>equation overfitting</a:t>
+                      </a:r>
+                      <a:endParaRPr sz="1200" dirty="0"/>
                     </a:p>
                     <a:p>
                       <a:pPr marL="0" lvl="0" indent="0" algn="l" rtl="0">
@@ -12317,10 +12445,14 @@
                         <a:buNone/>
                       </a:pPr>
                       <a:r>
-                        <a:rPr lang="en" sz="1200"/>
-                        <a:t>Plan:</a:t>
+                        <a:rPr lang="en" sz="1200" dirty="0"/>
+                        <a:t>Plan: </a:t>
                       </a:r>
-                      <a:endParaRPr sz="1200"/>
+                      <a:r>
+                        <a:rPr lang="en-US" sz="1200" dirty="0"/>
+                        <a:t>better algorithms must be searched to find the best fit. </a:t>
+                      </a:r>
+                      <a:endParaRPr sz="1200" dirty="0"/>
                     </a:p>
                     <a:p>
                       <a:pPr marL="0" lvl="0" indent="0" algn="l" rtl="0">
@@ -12332,7 +12464,7 @@
                         </a:spcAft>
                         <a:buNone/>
                       </a:pPr>
-                      <a:endParaRPr sz="1200"/>
+                      <a:endParaRPr sz="1200" dirty="0"/>
                     </a:p>
                   </a:txBody>
                   <a:tcPr marL="91425" marR="91425" marT="91425" marB="91425">
@@ -12479,10 +12611,14 @@
                         <a:buNone/>
                       </a:pPr>
                       <a:r>
-                        <a:rPr lang="en" sz="1200"/>
+                        <a:rPr lang="en" sz="1200" dirty="0"/>
                         <a:t>Concerns: </a:t>
                       </a:r>
-                      <a:endParaRPr sz="1200"/>
+                      <a:r>
+                        <a:rPr lang="en-US" sz="1200" dirty="0"/>
+                        <a:t>rarely exist</a:t>
+                      </a:r>
+                      <a:endParaRPr sz="1200" dirty="0"/>
                     </a:p>
                     <a:p>
                       <a:pPr marL="0" lvl="0" indent="0" algn="l" rtl="0">
@@ -12495,10 +12631,10 @@
                         <a:buNone/>
                       </a:pPr>
                       <a:r>
-                        <a:rPr lang="en" sz="1200"/>
+                        <a:rPr lang="en" sz="1200" dirty="0"/>
                         <a:t>Plan:</a:t>
                       </a:r>
-                      <a:endParaRPr sz="1200"/>
+                      <a:endParaRPr sz="1200" dirty="0"/>
                     </a:p>
                     <a:p>
                       <a:pPr marL="0" lvl="0" indent="0" algn="l" rtl="0">
@@ -12510,7 +12646,7 @@
                         </a:spcAft>
                         <a:buNone/>
                       </a:pPr>
-                      <a:endParaRPr sz="1200"/>
+                      <a:endParaRPr sz="1200" dirty="0"/>
                     </a:p>
                   </a:txBody>
                   <a:tcPr marL="91425" marR="91425" marT="91425" marB="91425">
@@ -12575,10 +12711,14 @@
                         <a:buNone/>
                       </a:pPr>
                       <a:r>
-                        <a:rPr lang="en" sz="1200"/>
+                        <a:rPr lang="en" sz="1200" dirty="0"/>
                         <a:t>Concerns: </a:t>
                       </a:r>
-                      <a:endParaRPr sz="1200"/>
+                      <a:r>
+                        <a:rPr lang="en-US" sz="1200" dirty="0"/>
+                        <a:t>not exist</a:t>
+                      </a:r>
+                      <a:endParaRPr sz="1200" dirty="0"/>
                     </a:p>
                     <a:p>
                       <a:pPr marL="0" lvl="0" indent="0" algn="l" rtl="0">
@@ -12591,10 +12731,10 @@
                         <a:buNone/>
                       </a:pPr>
                       <a:r>
-                        <a:rPr lang="en" sz="1200"/>
+                        <a:rPr lang="en" sz="1200" dirty="0"/>
                         <a:t>Plan:</a:t>
                       </a:r>
-                      <a:endParaRPr sz="1200"/>
+                      <a:endParaRPr sz="1200" dirty="0"/>
                     </a:p>
                     <a:p>
                       <a:pPr marL="0" lvl="0" indent="0" algn="l" rtl="0">
@@ -12606,7 +12746,7 @@
                         </a:spcAft>
                         <a:buNone/>
                       </a:pPr>
-                      <a:endParaRPr sz="1200"/>
+                      <a:endParaRPr sz="1200" dirty="0"/>
                     </a:p>
                   </a:txBody>
                   <a:tcPr marL="91425" marR="91425" marT="91425" marB="91425">
@@ -12733,33 +12873,6 @@
           </a:p>
         </p:txBody>
       </p:sp>
-      <p:pic>
-        <p:nvPicPr>
-          <p:cNvPr id="148" name="Google Shape;148;p21"/>
-          <p:cNvPicPr preferRelativeResize="0"/>
-          <p:nvPr/>
-        </p:nvPicPr>
-        <p:blipFill rotWithShape="1">
-          <a:blip r:embed="rId3">
-            <a:alphaModFix/>
-          </a:blip>
-          <a:srcRect t="24328"/>
-          <a:stretch/>
-        </p:blipFill>
-        <p:spPr>
-          <a:xfrm>
-            <a:off x="755225" y="3471550"/>
-            <a:ext cx="3449574" cy="1218200"/>
-          </a:xfrm>
-          <a:prstGeom prst="rect">
-            <a:avLst/>
-          </a:prstGeom>
-          <a:noFill/>
-          <a:ln>
-            <a:noFill/>
-          </a:ln>
-        </p:spPr>
-      </p:pic>
       <p:sp>
         <p:nvSpPr>
           <p:cNvPr id="149" name="Google Shape;149;p21"/>
@@ -12889,77 +13002,46 @@
           </a:bodyPr>
           <a:lstStyle/>
           <a:p>
-            <a:pPr marL="0" lvl="0" indent="0" algn="l" rtl="0">
-              <a:spcBef>
-                <a:spcPts val="0"/>
-              </a:spcBef>
-              <a:spcAft>
-                <a:spcPts val="0"/>
-              </a:spcAft>
-              <a:buNone/>
-            </a:pPr>
+            <a:pPr lvl="0"/>
             <a:r>
-              <a:rPr lang="en">
+              <a:rPr lang="en" dirty="0">
                 <a:latin typeface="Roboto"/>
                 <a:ea typeface="Roboto"/>
                 <a:cs typeface="Roboto"/>
                 <a:sym typeface="Roboto"/>
               </a:rPr>
-              <a:t>“Great job with x, y, z”</a:t>
+              <a:t>“</a:t>
             </a:r>
-            <a:endParaRPr>
-              <a:latin typeface="Roboto"/>
-              <a:ea typeface="Roboto"/>
-              <a:cs typeface="Roboto"/>
-              <a:sym typeface="Roboto"/>
-            </a:endParaRPr>
-          </a:p>
-        </p:txBody>
-      </p:sp>
-      <p:sp>
-        <p:nvSpPr>
-          <p:cNvPr id="152" name="Google Shape;152;p21"/>
-          <p:cNvSpPr txBox="1"/>
-          <p:nvPr/>
-        </p:nvSpPr>
-        <p:spPr>
-          <a:xfrm>
-            <a:off x="592725" y="2335913"/>
-            <a:ext cx="3433500" cy="396600"/>
-          </a:xfrm>
-          <a:prstGeom prst="rect">
-            <a:avLst/>
-          </a:prstGeom>
-          <a:noFill/>
-          <a:ln>
-            <a:noFill/>
-          </a:ln>
-        </p:spPr>
-        <p:txBody>
-          <a:bodyPr spcFirstLastPara="1" wrap="square" lIns="91425" tIns="91425" rIns="91425" bIns="91425" anchor="t" anchorCtr="0">
-            <a:noAutofit/>
-          </a:bodyPr>
-          <a:lstStyle/>
-          <a:p>
-            <a:pPr marL="0" lvl="0" indent="0" algn="l" rtl="0">
-              <a:spcBef>
-                <a:spcPts val="0"/>
-              </a:spcBef>
-              <a:spcAft>
-                <a:spcPts val="0"/>
-              </a:spcAft>
-              <a:buNone/>
-            </a:pPr>
             <a:r>
-              <a:rPr lang="en">
+              <a:rPr lang="en-US" dirty="0">
                 <a:latin typeface="Roboto"/>
                 <a:ea typeface="Roboto"/>
                 <a:cs typeface="Roboto"/>
                 <a:sym typeface="Roboto"/>
               </a:rPr>
-              <a:t>“___ Use case would fundamentally change our business because of ______”</a:t>
+              <a:t>The computer vison-based approach proposed is helpful in detecting detectives without labor intervention </a:t>
             </a:r>
-            <a:endParaRPr>
+          </a:p>
+          <a:p>
+            <a:pPr marL="0" lvl="0" indent="0" algn="l" rtl="0">
+              <a:spcBef>
+                <a:spcPts val="0"/>
+              </a:spcBef>
+              <a:spcAft>
+                <a:spcPts val="0"/>
+              </a:spcAft>
+              <a:buNone/>
+            </a:pPr>
+            <a:r>
+              <a:rPr lang="en" dirty="0">
+                <a:latin typeface="Roboto"/>
+                <a:ea typeface="Roboto"/>
+                <a:cs typeface="Roboto"/>
+                <a:sym typeface="Roboto"/>
+              </a:rPr>
+              <a:t>”</a:t>
+            </a:r>
+            <a:endParaRPr dirty="0">
               <a:latin typeface="Roboto"/>
               <a:ea typeface="Roboto"/>
               <a:cs typeface="Roboto"/>
@@ -13029,7 +13111,7 @@
               <a:buNone/>
             </a:pPr>
             <a:r>
-              <a:rPr lang="en" sz="1800" b="1">
+              <a:rPr lang="en" sz="1800" b="1" dirty="0">
                 <a:latin typeface="Roboto"/>
                 <a:ea typeface="Roboto"/>
                 <a:cs typeface="Roboto"/>
@@ -13037,7 +13119,7 @@
               </a:rPr>
               <a:t>Proposed Next Steps</a:t>
             </a:r>
-            <a:endParaRPr sz="1800" b="1">
+            <a:endParaRPr sz="1800" b="1" dirty="0">
               <a:latin typeface="Roboto"/>
               <a:ea typeface="Roboto"/>
               <a:cs typeface="Roboto"/>
@@ -13054,7 +13136,7 @@
               </a:spcAft>
               <a:buNone/>
             </a:pPr>
-            <a:endParaRPr sz="1000" b="1">
+            <a:endParaRPr sz="1000" b="1" dirty="0">
               <a:latin typeface="Roboto"/>
               <a:ea typeface="Roboto"/>
               <a:cs typeface="Roboto"/>
@@ -13074,15 +13156,15 @@
               <a:buChar char="-"/>
             </a:pPr>
             <a:r>
-              <a:rPr lang="en">
+              <a:rPr lang="en-US" dirty="0">
                 <a:latin typeface="Roboto"/>
                 <a:ea typeface="Roboto"/>
                 <a:cs typeface="Roboto"/>
                 <a:sym typeface="Roboto"/>
               </a:rPr>
-              <a:t>Proposed next step 1</a:t>
+              <a:t>Search for better cameras</a:t>
             </a:r>
-            <a:endParaRPr>
+            <a:endParaRPr dirty="0">
               <a:latin typeface="Roboto"/>
               <a:ea typeface="Roboto"/>
               <a:cs typeface="Roboto"/>
@@ -13102,15 +13184,15 @@
               <a:buChar char="-"/>
             </a:pPr>
             <a:r>
-              <a:rPr lang="en">
+              <a:rPr lang="en-US" dirty="0">
                 <a:latin typeface="Roboto"/>
                 <a:ea typeface="Roboto"/>
                 <a:cs typeface="Roboto"/>
                 <a:sym typeface="Roboto"/>
               </a:rPr>
-              <a:t>Proposed next step 2</a:t>
+              <a:t>Search for better sensors</a:t>
             </a:r>
-            <a:endParaRPr>
+            <a:endParaRPr dirty="0">
               <a:latin typeface="Roboto"/>
               <a:ea typeface="Roboto"/>
               <a:cs typeface="Roboto"/>
@@ -13130,15 +13212,15 @@
               <a:buChar char="-"/>
             </a:pPr>
             <a:r>
-              <a:rPr lang="en">
+              <a:rPr lang="en-US" dirty="0">
                 <a:latin typeface="Roboto"/>
                 <a:ea typeface="Roboto"/>
                 <a:cs typeface="Roboto"/>
                 <a:sym typeface="Roboto"/>
               </a:rPr>
-              <a:t>Proposed next step 3</a:t>
+              <a:t>Research most suitable AI technology</a:t>
             </a:r>
-            <a:endParaRPr>
+            <a:endParaRPr dirty="0">
               <a:latin typeface="Roboto"/>
               <a:ea typeface="Roboto"/>
               <a:cs typeface="Roboto"/>
@@ -13268,7 +13350,7 @@
               <a:buNone/>
             </a:pPr>
             <a:r>
-              <a:rPr lang="en" sz="1200" b="1" u="sng">
+              <a:rPr lang="en" sz="1200" b="1" u="sng" dirty="0">
                 <a:latin typeface="Roboto"/>
                 <a:ea typeface="Roboto"/>
                 <a:cs typeface="Roboto"/>
@@ -13276,7 +13358,7 @@
               </a:rPr>
               <a:t>Month 1</a:t>
             </a:r>
-            <a:endParaRPr sz="1200" b="1" u="sng">
+            <a:endParaRPr sz="1200" b="1" u="sng" dirty="0">
               <a:latin typeface="Roboto"/>
               <a:ea typeface="Roboto"/>
               <a:cs typeface="Roboto"/>
@@ -13296,43 +13378,15 @@
               <a:buChar char="-"/>
             </a:pPr>
             <a:r>
-              <a:rPr lang="en" sz="1200">
+              <a:rPr lang="en-US" sz="1200" dirty="0">
                 <a:latin typeface="Roboto"/>
                 <a:ea typeface="Roboto"/>
                 <a:cs typeface="Roboto"/>
                 <a:sym typeface="Roboto"/>
               </a:rPr>
-              <a:t>Deliverable 1</a:t>
+              <a:t>Requirement analysis and design</a:t>
             </a:r>
-            <a:endParaRPr sz="1200">
-              <a:latin typeface="Roboto"/>
-              <a:ea typeface="Roboto"/>
-              <a:cs typeface="Roboto"/>
-              <a:sym typeface="Roboto"/>
-            </a:endParaRPr>
-          </a:p>
-          <a:p>
-            <a:pPr marL="457200" lvl="0" indent="-304800" algn="l" rtl="0">
-              <a:spcBef>
-                <a:spcPts val="0"/>
-              </a:spcBef>
-              <a:spcAft>
-                <a:spcPts val="0"/>
-              </a:spcAft>
-              <a:buSzPts val="1200"/>
-              <a:buFont typeface="Roboto"/>
-              <a:buChar char="-"/>
-            </a:pPr>
-            <a:r>
-              <a:rPr lang="en" sz="1200">
-                <a:latin typeface="Roboto"/>
-                <a:ea typeface="Roboto"/>
-                <a:cs typeface="Roboto"/>
-                <a:sym typeface="Roboto"/>
-              </a:rPr>
-              <a:t>Deliverable 2</a:t>
-            </a:r>
-            <a:endParaRPr sz="1200">
+            <a:endParaRPr sz="1200" dirty="0">
               <a:latin typeface="Roboto"/>
               <a:ea typeface="Roboto"/>
               <a:cs typeface="Roboto"/>
@@ -13376,7 +13430,7 @@
               <a:buNone/>
             </a:pPr>
             <a:r>
-              <a:rPr lang="en" sz="1200" b="1" u="sng">
+              <a:rPr lang="en" sz="1200" b="1" u="sng" dirty="0">
                 <a:latin typeface="Roboto"/>
                 <a:ea typeface="Roboto"/>
                 <a:cs typeface="Roboto"/>
@@ -13384,7 +13438,7 @@
               </a:rPr>
               <a:t>Month 2</a:t>
             </a:r>
-            <a:endParaRPr sz="1200" b="1" u="sng">
+            <a:endParaRPr sz="1200" b="1" u="sng" dirty="0">
               <a:latin typeface="Roboto"/>
               <a:ea typeface="Roboto"/>
               <a:cs typeface="Roboto"/>
@@ -13404,43 +13458,15 @@
               <a:buChar char="-"/>
             </a:pPr>
             <a:r>
-              <a:rPr lang="en" sz="1200">
+              <a:rPr lang="en-US" sz="1200" dirty="0">
                 <a:latin typeface="Roboto"/>
                 <a:ea typeface="Roboto"/>
                 <a:cs typeface="Roboto"/>
                 <a:sym typeface="Roboto"/>
               </a:rPr>
-              <a:t>Deliverable 1</a:t>
+              <a:t>System design</a:t>
             </a:r>
-            <a:endParaRPr sz="1200">
-              <a:latin typeface="Roboto"/>
-              <a:ea typeface="Roboto"/>
-              <a:cs typeface="Roboto"/>
-              <a:sym typeface="Roboto"/>
-            </a:endParaRPr>
-          </a:p>
-          <a:p>
-            <a:pPr marL="457200" lvl="0" indent="-304800" algn="l" rtl="0">
-              <a:spcBef>
-                <a:spcPts val="0"/>
-              </a:spcBef>
-              <a:spcAft>
-                <a:spcPts val="0"/>
-              </a:spcAft>
-              <a:buSzPts val="1200"/>
-              <a:buFont typeface="Roboto"/>
-              <a:buChar char="-"/>
-            </a:pPr>
-            <a:r>
-              <a:rPr lang="en" sz="1200">
-                <a:latin typeface="Roboto"/>
-                <a:ea typeface="Roboto"/>
-                <a:cs typeface="Roboto"/>
-                <a:sym typeface="Roboto"/>
-              </a:rPr>
-              <a:t>Deliverable 2</a:t>
-            </a:r>
-            <a:endParaRPr sz="1200">
+            <a:endParaRPr sz="1200" dirty="0">
               <a:latin typeface="Roboto"/>
               <a:ea typeface="Roboto"/>
               <a:cs typeface="Roboto"/>
@@ -13484,7 +13510,7 @@
               <a:buNone/>
             </a:pPr>
             <a:r>
-              <a:rPr lang="en" sz="1200" b="1" u="sng">
+              <a:rPr lang="en" sz="1200" b="1" u="sng" dirty="0">
                 <a:latin typeface="Roboto"/>
                 <a:ea typeface="Roboto"/>
                 <a:cs typeface="Roboto"/>
@@ -13492,7 +13518,7 @@
               </a:rPr>
               <a:t>Month 3</a:t>
             </a:r>
-            <a:endParaRPr sz="1200" b="1" u="sng">
+            <a:endParaRPr sz="1200" b="1" u="sng" dirty="0">
               <a:latin typeface="Roboto"/>
               <a:ea typeface="Roboto"/>
               <a:cs typeface="Roboto"/>
@@ -13512,15 +13538,15 @@
               <a:buChar char="-"/>
             </a:pPr>
             <a:r>
-              <a:rPr lang="en" sz="1200">
+              <a:rPr lang="en-US" sz="1200" dirty="0">
                 <a:latin typeface="Roboto"/>
                 <a:ea typeface="Roboto"/>
                 <a:cs typeface="Roboto"/>
                 <a:sym typeface="Roboto"/>
               </a:rPr>
-              <a:t>Final Deliverable</a:t>
+              <a:t>Implementation and testing</a:t>
             </a:r>
-            <a:endParaRPr sz="1200">
+            <a:endParaRPr sz="1200" dirty="0">
               <a:latin typeface="Roboto"/>
               <a:ea typeface="Roboto"/>
               <a:cs typeface="Roboto"/>
@@ -13537,7 +13563,7 @@
               </a:spcAft>
               <a:buNone/>
             </a:pPr>
-            <a:endParaRPr sz="1200">
+            <a:endParaRPr sz="1200" dirty="0">
               <a:latin typeface="Roboto"/>
               <a:ea typeface="Roboto"/>
               <a:cs typeface="Roboto"/>
@@ -13546,6 +13572,53 @@
           </a:p>
         </p:txBody>
       </p:sp>
+      <p:pic>
+        <p:nvPicPr>
+          <p:cNvPr id="14" name="Picture 2" descr="Forms response chart. Question title: Based on the description above, how familiar would you say you are with the area being discussed in Use Case 1?. Number of responses: .">
+            <a:extLst>
+              <a:ext uri="{FF2B5EF4-FFF2-40B4-BE49-F238E27FC236}">
+                <a16:creationId xmlns:a16="http://schemas.microsoft.com/office/drawing/2014/main" id="{DC6ED223-EC4E-437A-A996-FE1BFC934090}"/>
+              </a:ext>
+            </a:extLst>
+          </p:cNvPr>
+          <p:cNvPicPr>
+            <a:picLocks noChangeAspect="1" noChangeArrowheads="1"/>
+          </p:cNvPicPr>
+          <p:nvPr/>
+        </p:nvPicPr>
+        <p:blipFill>
+          <a:blip r:embed="rId3">
+            <a:extLst>
+              <a:ext uri="{28A0092B-C50C-407E-A947-70E740481C1C}">
+                <a14:useLocalDpi xmlns:a14="http://schemas.microsoft.com/office/drawing/2010/main" val="0"/>
+              </a:ext>
+            </a:extLst>
+          </a:blip>
+          <a:srcRect/>
+          <a:stretch>
+            <a:fillRect/>
+          </a:stretch>
+        </p:blipFill>
+        <p:spPr bwMode="auto">
+          <a:xfrm>
+            <a:off x="736812" y="3565232"/>
+            <a:ext cx="2805208" cy="1463968"/>
+          </a:xfrm>
+          <a:prstGeom prst="rect">
+            <a:avLst/>
+          </a:prstGeom>
+          <a:noFill/>
+          <a:extLst>
+            <a:ext uri="{909E8E84-426E-40DD-AFC4-6F175D3DCCD1}">
+              <a14:hiddenFill xmlns:a14="http://schemas.microsoft.com/office/drawing/2010/main">
+                <a:solidFill>
+                  <a:srgbClr val="FFFFFF"/>
+                </a:solidFill>
+              </a14:hiddenFill>
+            </a:ext>
+          </a:extLst>
+        </p:spPr>
+      </p:pic>
     </p:spTree>
   </p:cSld>
   <p:clrMapOvr>

</xml_diff>